<commit_message>
Changed pipeline text and the report structure
</commit_message>
<xml_diff>
--- a/report/LyxReportStructure/images/Pipeline.pptx
+++ b/report/LyxReportStructure/images/Pipeline.pptx
@@ -3067,8 +3067,8 @@
         </p:nvSpPr>
         <p:spPr>
           <a:xfrm>
-            <a:off x="4495800" y="0"/>
-            <a:ext cx="1828800" cy="6858000"/>
+            <a:off x="4541772" y="0"/>
+            <a:ext cx="1752600" cy="6858000"/>
           </a:xfrm>
           <a:prstGeom prst="rect">
             <a:avLst/>
@@ -3116,8 +3116,8 @@
         </p:nvSpPr>
         <p:spPr>
           <a:xfrm>
-            <a:off x="1752600" y="2507043"/>
-            <a:ext cx="1295400" cy="838200"/>
+            <a:off x="1729929" y="2507043"/>
+            <a:ext cx="1463040" cy="838200"/>
           </a:xfrm>
           <a:prstGeom prst="roundRect">
             <a:avLst/>
@@ -3148,10 +3148,11 @@
           <a:p>
             <a:pPr algn="ctr"/>
             <a:r>
-              <a:rPr lang="en-US" sz="1400" b="1" dirty="0" smtClean="0">
+              <a:rPr lang="en-US" sz="1500" b="1" dirty="0" smtClean="0">
                 <a:solidFill>
                   <a:schemeClr val="tx1"/>
                 </a:solidFill>
+                <a:latin typeface="+mj-lt"/>
               </a:rPr>
               <a:t>Mitochondria as</a:t>
             </a:r>
@@ -3159,17 +3160,19 @@
           <a:p>
             <a:pPr algn="ctr"/>
             <a:r>
-              <a:rPr lang="en-US" sz="1400" b="1" dirty="0" smtClean="0">
+              <a:rPr lang="en-US" sz="1500" b="1" dirty="0" smtClean="0">
                 <a:solidFill>
                   <a:schemeClr val="tx1"/>
                 </a:solidFill>
+                <a:latin typeface="+mj-lt"/>
               </a:rPr>
               <a:t>blobs</a:t>
             </a:r>
-            <a:endParaRPr lang="en-US" sz="1400" b="1" dirty="0">
+            <a:endParaRPr lang="en-US" sz="1500" b="1" dirty="0">
               <a:solidFill>
                 <a:schemeClr val="tx1"/>
               </a:solidFill>
+              <a:latin typeface="+mj-lt"/>
             </a:endParaRPr>
           </a:p>
         </p:txBody>
@@ -3214,17 +3217,19 @@
           <a:p>
             <a:pPr algn="ctr"/>
             <a:r>
-              <a:rPr lang="en-US" sz="1400" b="1" dirty="0" smtClean="0">
+              <a:rPr lang="en-US" sz="1500" b="1" dirty="0" smtClean="0">
                 <a:solidFill>
                   <a:schemeClr val="tx1"/>
                 </a:solidFill>
+                <a:latin typeface="+mj-lt"/>
               </a:rPr>
               <a:t>Sharpest image</a:t>
             </a:r>
-            <a:endParaRPr lang="en-US" sz="1400" b="1" dirty="0">
+            <a:endParaRPr lang="en-US" sz="1500" b="1" dirty="0">
               <a:solidFill>
                 <a:schemeClr val="tx1"/>
               </a:solidFill>
+              <a:latin typeface="+mj-lt"/>
             </a:endParaRPr>
           </a:p>
         </p:txBody>
@@ -3237,8 +3242,8 @@
         </p:nvSpPr>
         <p:spPr>
           <a:xfrm>
-            <a:off x="4876800" y="3429000"/>
-            <a:ext cx="1066800" cy="533400"/>
+            <a:off x="4990155" y="3429000"/>
+            <a:ext cx="1097280" cy="533400"/>
           </a:xfrm>
           <a:prstGeom prst="roundRect">
             <a:avLst/>
@@ -3269,17 +3274,19 @@
           <a:p>
             <a:pPr algn="ctr"/>
             <a:r>
-              <a:rPr lang="en-US" sz="1400" b="1" dirty="0" smtClean="0">
+              <a:rPr lang="en-US" sz="1500" b="1" dirty="0" smtClean="0">
                 <a:solidFill>
                   <a:schemeClr val="tx1"/>
                 </a:solidFill>
+                <a:latin typeface="+mj-lt"/>
               </a:rPr>
               <a:t>SVM</a:t>
             </a:r>
-            <a:endParaRPr lang="en-US" sz="1400" b="1" dirty="0">
+            <a:endParaRPr lang="en-US" sz="1500" b="1" dirty="0">
               <a:solidFill>
                 <a:schemeClr val="tx1"/>
               </a:solidFill>
+              <a:latin typeface="+mj-lt"/>
             </a:endParaRPr>
           </a:p>
         </p:txBody>
@@ -3292,8 +3299,8 @@
         </p:nvSpPr>
         <p:spPr>
           <a:xfrm>
-            <a:off x="4876800" y="1791015"/>
-            <a:ext cx="1066800" cy="609600"/>
+            <a:off x="4990155" y="1791015"/>
+            <a:ext cx="1097280" cy="609600"/>
           </a:xfrm>
           <a:prstGeom prst="roundRect">
             <a:avLst/>
@@ -3324,17 +3331,19 @@
           <a:p>
             <a:pPr algn="ctr"/>
             <a:r>
-              <a:rPr lang="en-US" sz="1400" b="1" dirty="0" smtClean="0">
+              <a:rPr lang="en-US" sz="1500" b="1" dirty="0" smtClean="0">
                 <a:solidFill>
                   <a:schemeClr val="tx1"/>
                 </a:solidFill>
+                <a:latin typeface="+mj-lt"/>
               </a:rPr>
               <a:t>MLE</a:t>
             </a:r>
-            <a:endParaRPr lang="en-US" sz="1400" b="1" dirty="0">
+            <a:endParaRPr lang="en-US" sz="1500" b="1" dirty="0">
               <a:solidFill>
                 <a:schemeClr val="tx1"/>
               </a:solidFill>
+              <a:latin typeface="+mj-lt"/>
             </a:endParaRPr>
           </a:p>
         </p:txBody>
@@ -3347,8 +3356,8 @@
         </p:nvSpPr>
         <p:spPr>
           <a:xfrm>
-            <a:off x="4876800" y="2491929"/>
-            <a:ext cx="1066800" cy="838200"/>
+            <a:off x="4990155" y="2491929"/>
+            <a:ext cx="1097280" cy="838200"/>
           </a:xfrm>
           <a:prstGeom prst="roundRect">
             <a:avLst/>
@@ -3379,17 +3388,19 @@
           <a:p>
             <a:pPr algn="ctr"/>
             <a:r>
-              <a:rPr lang="en-US" sz="1400" b="1" dirty="0" smtClean="0">
+              <a:rPr lang="en-US" sz="1500" b="1" dirty="0" smtClean="0">
                 <a:solidFill>
                   <a:schemeClr val="tx1"/>
                 </a:solidFill>
+                <a:latin typeface="+mj-lt"/>
               </a:rPr>
               <a:t>Logistic regression</a:t>
             </a:r>
-            <a:endParaRPr lang="en-US" sz="1400" b="1" dirty="0">
+            <a:endParaRPr lang="en-US" sz="1500" b="1" dirty="0">
               <a:solidFill>
                 <a:schemeClr val="tx1"/>
               </a:solidFill>
+              <a:latin typeface="+mj-lt"/>
             </a:endParaRPr>
           </a:p>
         </p:txBody>
@@ -3402,8 +3413,8 @@
         </p:nvSpPr>
         <p:spPr>
           <a:xfrm>
-            <a:off x="4876800" y="4061271"/>
-            <a:ext cx="1069848" cy="533400"/>
+            <a:off x="4990155" y="4061271"/>
+            <a:ext cx="1097280" cy="533400"/>
           </a:xfrm>
           <a:prstGeom prst="roundRect">
             <a:avLst/>
@@ -3434,17 +3445,19 @@
           <a:p>
             <a:pPr algn="ctr"/>
             <a:r>
-              <a:rPr lang="en-US" sz="1400" b="1" dirty="0" smtClean="0">
+              <a:rPr lang="en-US" sz="1500" b="1" dirty="0" smtClean="0">
                 <a:solidFill>
                   <a:schemeClr val="tx1"/>
                 </a:solidFill>
+                <a:latin typeface="+mj-lt"/>
               </a:rPr>
               <a:t>Neural network</a:t>
             </a:r>
-            <a:endParaRPr lang="en-US" sz="1400" b="1" dirty="0">
+            <a:endParaRPr lang="en-US" sz="1500" b="1" dirty="0">
               <a:solidFill>
                 <a:schemeClr val="tx1"/>
               </a:solidFill>
+              <a:latin typeface="+mj-lt"/>
             </a:endParaRPr>
           </a:p>
         </p:txBody>
@@ -3457,8 +3470,8 @@
         </p:nvSpPr>
         <p:spPr>
           <a:xfrm>
-            <a:off x="3321942" y="2590800"/>
-            <a:ext cx="1066800" cy="647385"/>
+            <a:off x="3429000" y="2590800"/>
+            <a:ext cx="1005840" cy="647385"/>
           </a:xfrm>
           <a:prstGeom prst="roundRect">
             <a:avLst/>
@@ -3489,17 +3502,19 @@
           <a:p>
             <a:pPr algn="ctr"/>
             <a:r>
-              <a:rPr lang="en-US" sz="1400" b="1" dirty="0" smtClean="0">
+              <a:rPr lang="en-US" sz="1500" b="1" dirty="0" smtClean="0">
                 <a:solidFill>
                   <a:schemeClr val="tx1"/>
                 </a:solidFill>
+                <a:latin typeface="+mj-lt"/>
               </a:rPr>
               <a:t>Features</a:t>
             </a:r>
-            <a:endParaRPr lang="en-US" sz="1400" b="1" dirty="0">
+            <a:endParaRPr lang="en-US" sz="1500" b="1" dirty="0">
               <a:solidFill>
                 <a:schemeClr val="tx1"/>
               </a:solidFill>
+              <a:latin typeface="+mj-lt"/>
             </a:endParaRPr>
           </a:p>
         </p:txBody>
@@ -3515,8 +3530,8 @@
         </p:nvCxnSpPr>
         <p:spPr>
           <a:xfrm flipV="1">
-            <a:off x="4388742" y="2095815"/>
-            <a:ext cx="488058" cy="818678"/>
+            <a:off x="4434840" y="2095815"/>
+            <a:ext cx="555315" cy="818678"/>
           </a:xfrm>
           <a:prstGeom prst="bentConnector3">
             <a:avLst>
@@ -3556,8 +3571,8 @@
         </p:nvCxnSpPr>
         <p:spPr>
           <a:xfrm flipV="1">
-            <a:off x="3048000" y="2914493"/>
-            <a:ext cx="273942" cy="11650"/>
+            <a:off x="3192969" y="2914493"/>
+            <a:ext cx="236031" cy="11650"/>
           </a:xfrm>
           <a:prstGeom prst="straightConnector1">
             <a:avLst/>
@@ -3593,7 +3608,7 @@
         <p:spPr>
           <a:xfrm>
             <a:off x="1493772" y="2925828"/>
-            <a:ext cx="258828" cy="315"/>
+            <a:ext cx="236157" cy="315"/>
           </a:xfrm>
           <a:prstGeom prst="straightConnector1">
             <a:avLst/>
@@ -3628,8 +3643,8 @@
         </p:nvCxnSpPr>
         <p:spPr>
           <a:xfrm>
-            <a:off x="4388742" y="2914493"/>
-            <a:ext cx="488058" cy="781207"/>
+            <a:off x="4434840" y="2914493"/>
+            <a:ext cx="555315" cy="781207"/>
           </a:xfrm>
           <a:prstGeom prst="bentConnector3">
             <a:avLst>
@@ -3669,8 +3684,8 @@
         </p:nvCxnSpPr>
         <p:spPr>
           <a:xfrm flipV="1">
-            <a:off x="4388742" y="2911029"/>
-            <a:ext cx="488058" cy="3464"/>
+            <a:off x="4434840" y="2911029"/>
+            <a:ext cx="555315" cy="3464"/>
           </a:xfrm>
           <a:prstGeom prst="bentConnector3">
             <a:avLst>
@@ -3710,8 +3725,8 @@
         </p:nvCxnSpPr>
         <p:spPr>
           <a:xfrm rot="16200000" flipH="1">
-            <a:off x="3147186" y="2598357"/>
-            <a:ext cx="982728" cy="2476500"/>
+            <a:off x="3234438" y="2572254"/>
+            <a:ext cx="982728" cy="2528706"/>
           </a:xfrm>
           <a:prstGeom prst="bentConnector2">
             <a:avLst/>
@@ -3747,7 +3762,7 @@
         <p:spPr>
           <a:xfrm>
             <a:off x="4800600" y="1295400"/>
-            <a:ext cx="1161536" cy="369332"/>
+            <a:ext cx="1228478" cy="323165"/>
           </a:xfrm>
           <a:prstGeom prst="rect">
             <a:avLst/>
@@ -3761,10 +3776,14 @@
           <a:lstStyle/>
           <a:p>
             <a:r>
-              <a:rPr lang="en-US" b="1" dirty="0" smtClean="0"/>
-              <a:t>Prediction</a:t>
-            </a:r>
-            <a:endParaRPr lang="en-US" b="1" dirty="0"/>
+              <a:rPr lang="en-US" sz="1500" b="1" dirty="0" smtClean="0">
+                <a:latin typeface="+mj-lt"/>
+              </a:rPr>
+              <a:t>Classification</a:t>
+            </a:r>
+            <a:endParaRPr lang="en-US" sz="1500" b="1" dirty="0">
+              <a:latin typeface="+mj-lt"/>
+            </a:endParaRPr>
           </a:p>
         </p:txBody>
       </p:sp>

</xml_diff>